<commit_message>
Add DE ver fig 1
</commit_message>
<xml_diff>
--- a/figs/GD_steps.pptx
+++ b/figs/GD_steps.pptx
@@ -7,6 +7,7 @@
   <p:sldIdLst>
     <p:sldId id="256" r:id="rId5"/>
     <p:sldId id="257" r:id="rId6"/>
+    <p:sldId id="261" r:id="rId7"/>
   </p:sldIdLst>
   <p:sldSz cx="12192000" cy="6858000"/>
   <p:notesSz cx="6858000" cy="9144000"/>
@@ -273,7 +274,7 @@
           <a:p>
             <a:fld id="{306E92B3-EED3-4B70-89B9-9207C2DBB711}" type="datetimeFigureOut">
               <a:rPr lang="es-ES" smtClean="0"/>
-              <a:t>29/07/2021</a:t>
+              <a:t>16/09/2021</a:t>
             </a:fld>
             <a:endParaRPr lang="es-ES"/>
           </a:p>
@@ -473,7 +474,7 @@
           <a:p>
             <a:fld id="{306E92B3-EED3-4B70-89B9-9207C2DBB711}" type="datetimeFigureOut">
               <a:rPr lang="es-ES" smtClean="0"/>
-              <a:t>29/07/2021</a:t>
+              <a:t>16/09/2021</a:t>
             </a:fld>
             <a:endParaRPr lang="es-ES"/>
           </a:p>
@@ -683,7 +684,7 @@
           <a:p>
             <a:fld id="{306E92B3-EED3-4B70-89B9-9207C2DBB711}" type="datetimeFigureOut">
               <a:rPr lang="es-ES" smtClean="0"/>
-              <a:t>29/07/2021</a:t>
+              <a:t>16/09/2021</a:t>
             </a:fld>
             <a:endParaRPr lang="es-ES"/>
           </a:p>
@@ -883,7 +884,7 @@
           <a:p>
             <a:fld id="{306E92B3-EED3-4B70-89B9-9207C2DBB711}" type="datetimeFigureOut">
               <a:rPr lang="es-ES" smtClean="0"/>
-              <a:t>29/07/2021</a:t>
+              <a:t>16/09/2021</a:t>
             </a:fld>
             <a:endParaRPr lang="es-ES"/>
           </a:p>
@@ -1159,7 +1160,7 @@
           <a:p>
             <a:fld id="{306E92B3-EED3-4B70-89B9-9207C2DBB711}" type="datetimeFigureOut">
               <a:rPr lang="es-ES" smtClean="0"/>
-              <a:t>29/07/2021</a:t>
+              <a:t>16/09/2021</a:t>
             </a:fld>
             <a:endParaRPr lang="es-ES"/>
           </a:p>
@@ -1427,7 +1428,7 @@
           <a:p>
             <a:fld id="{306E92B3-EED3-4B70-89B9-9207C2DBB711}" type="datetimeFigureOut">
               <a:rPr lang="es-ES" smtClean="0"/>
-              <a:t>29/07/2021</a:t>
+              <a:t>16/09/2021</a:t>
             </a:fld>
             <a:endParaRPr lang="es-ES"/>
           </a:p>
@@ -1842,7 +1843,7 @@
           <a:p>
             <a:fld id="{306E92B3-EED3-4B70-89B9-9207C2DBB711}" type="datetimeFigureOut">
               <a:rPr lang="es-ES" smtClean="0"/>
-              <a:t>29/07/2021</a:t>
+              <a:t>16/09/2021</a:t>
             </a:fld>
             <a:endParaRPr lang="es-ES"/>
           </a:p>
@@ -1984,7 +1985,7 @@
           <a:p>
             <a:fld id="{306E92B3-EED3-4B70-89B9-9207C2DBB711}" type="datetimeFigureOut">
               <a:rPr lang="es-ES" smtClean="0"/>
-              <a:t>29/07/2021</a:t>
+              <a:t>16/09/2021</a:t>
             </a:fld>
             <a:endParaRPr lang="es-ES"/>
           </a:p>
@@ -2097,7 +2098,7 @@
           <a:p>
             <a:fld id="{306E92B3-EED3-4B70-89B9-9207C2DBB711}" type="datetimeFigureOut">
               <a:rPr lang="es-ES" smtClean="0"/>
-              <a:t>29/07/2021</a:t>
+              <a:t>16/09/2021</a:t>
             </a:fld>
             <a:endParaRPr lang="es-ES"/>
           </a:p>
@@ -2410,7 +2411,7 @@
           <a:p>
             <a:fld id="{306E92B3-EED3-4B70-89B9-9207C2DBB711}" type="datetimeFigureOut">
               <a:rPr lang="es-ES" smtClean="0"/>
-              <a:t>29/07/2021</a:t>
+              <a:t>16/09/2021</a:t>
             </a:fld>
             <a:endParaRPr lang="es-ES"/>
           </a:p>
@@ -2699,7 +2700,7 @@
           <a:p>
             <a:fld id="{306E92B3-EED3-4B70-89B9-9207C2DBB711}" type="datetimeFigureOut">
               <a:rPr lang="es-ES" smtClean="0"/>
-              <a:t>29/07/2021</a:t>
+              <a:t>16/09/2021</a:t>
             </a:fld>
             <a:endParaRPr lang="es-ES"/>
           </a:p>
@@ -2942,7 +2943,7 @@
           <a:p>
             <a:fld id="{306E92B3-EED3-4B70-89B9-9207C2DBB711}" type="datetimeFigureOut">
               <a:rPr lang="es-ES" smtClean="0"/>
-              <a:t>29/07/2021</a:t>
+              <a:t>16/09/2021</a:t>
             </a:fld>
             <a:endParaRPr lang="es-ES"/>
           </a:p>
@@ -6431,6 +6432,1409 @@
 </p:sld>
 </file>
 
+<file path=ppt/slides/slide3.xml><?xml version="1.0" encoding="utf-8"?>
+<p:sld xmlns:a="http://schemas.openxmlformats.org/drawingml/2006/main" xmlns:r="http://schemas.openxmlformats.org/officeDocument/2006/relationships" xmlns:p="http://schemas.openxmlformats.org/presentationml/2006/main">
+  <p:cSld>
+    <p:spTree>
+      <p:nvGrpSpPr>
+        <p:cNvPr id="1" name=""/>
+        <p:cNvGrpSpPr/>
+        <p:nvPr/>
+      </p:nvGrpSpPr>
+      <p:grpSpPr>
+        <a:xfrm>
+          <a:off x="0" y="0"/>
+          <a:ext cx="0" cy="0"/>
+          <a:chOff x="0" y="0"/>
+          <a:chExt cx="0" cy="0"/>
+        </a:xfrm>
+      </p:grpSpPr>
+      <p:sp>
+        <p:nvSpPr>
+          <p:cNvPr id="7" name="Rechteck 6"/>
+          <p:cNvSpPr/>
+          <p:nvPr/>
+        </p:nvSpPr>
+        <p:spPr>
+          <a:xfrm>
+            <a:off x="335591" y="1598591"/>
+            <a:ext cx="11435150" cy="4578924"/>
+          </a:xfrm>
+          <a:prstGeom prst="rect">
+            <a:avLst/>
+          </a:prstGeom>
+          <a:solidFill>
+            <a:schemeClr val="bg1"/>
+          </a:solidFill>
+          <a:ln>
+            <a:noFill/>
+          </a:ln>
+        </p:spPr>
+        <p:style>
+          <a:lnRef idx="2">
+            <a:schemeClr val="accent1">
+              <a:shade val="50000"/>
+            </a:schemeClr>
+          </a:lnRef>
+          <a:fillRef idx="1">
+            <a:schemeClr val="accent1"/>
+          </a:fillRef>
+          <a:effectRef idx="0">
+            <a:schemeClr val="accent1"/>
+          </a:effectRef>
+          <a:fontRef idx="minor">
+            <a:schemeClr val="lt1"/>
+          </a:fontRef>
+        </p:style>
+        <p:txBody>
+          <a:bodyPr rtlCol="0" anchor="ctr"/>
+          <a:lstStyle/>
+          <a:p>
+            <a:pPr algn="ctr"/>
+            <a:endParaRPr lang="de-DE"/>
+          </a:p>
+        </p:txBody>
+      </p:sp>
+      <p:grpSp>
+        <p:nvGrpSpPr>
+          <p:cNvPr id="18" name="Group 17">
+            <a:extLst>
+              <a:ext uri="{FF2B5EF4-FFF2-40B4-BE49-F238E27FC236}">
+                <a16:creationId xmlns:a16="http://schemas.microsoft.com/office/drawing/2014/main" id="{AC8151CD-EBFD-41EE-B91E-8F825AF72CB8}"/>
+              </a:ext>
+            </a:extLst>
+          </p:cNvPr>
+          <p:cNvGrpSpPr/>
+          <p:nvPr/>
+        </p:nvGrpSpPr>
+        <p:grpSpPr>
+          <a:xfrm>
+            <a:off x="6158730" y="1634110"/>
+            <a:ext cx="5612010" cy="3012701"/>
+            <a:chOff x="3669064" y="1565242"/>
+            <a:chExt cx="6904568" cy="3856617"/>
+          </a:xfrm>
+        </p:grpSpPr>
+        <p:pic>
+          <p:nvPicPr>
+            <p:cNvPr id="2" name="Picture 1"/>
+            <p:cNvPicPr>
+              <a:picLocks noChangeAspect="1"/>
+            </p:cNvPicPr>
+            <p:nvPr/>
+          </p:nvPicPr>
+          <p:blipFill rotWithShape="1">
+            <a:blip r:embed="rId2" cstate="print">
+              <a:extLst>
+                <a:ext uri="{BEBA8EAE-BF5A-486C-A8C5-ECC9F3942E4B}">
+                  <a14:imgProps xmlns:a14="http://schemas.microsoft.com/office/drawing/2010/main">
+                    <a14:imgLayer r:embed="rId3">
+                      <a14:imgEffect>
+                        <a14:sharpenSoften amount="50000"/>
+                      </a14:imgEffect>
+                    </a14:imgLayer>
+                  </a14:imgProps>
+                </a:ext>
+                <a:ext uri="{28A0092B-C50C-407E-A947-70E740481C1C}">
+                  <a14:useLocalDpi xmlns:a14="http://schemas.microsoft.com/office/drawing/2010/main" val="0"/>
+                </a:ext>
+              </a:extLst>
+            </a:blip>
+            <a:srcRect l="30094" t="24470" r="13273" b="19294"/>
+            <a:stretch/>
+          </p:blipFill>
+          <p:spPr>
+            <a:xfrm>
+              <a:off x="3669064" y="1565242"/>
+              <a:ext cx="6904568" cy="3856617"/>
+            </a:xfrm>
+            <a:prstGeom prst="rect">
+              <a:avLst/>
+            </a:prstGeom>
+          </p:spPr>
+        </p:pic>
+        <p:sp>
+          <p:nvSpPr>
+            <p:cNvPr id="4" name="TextBox 3"/>
+            <p:cNvSpPr txBox="1"/>
+            <p:nvPr/>
+          </p:nvSpPr>
+          <p:spPr>
+            <a:xfrm>
+              <a:off x="4376913" y="4674623"/>
+              <a:ext cx="912263" cy="354592"/>
+            </a:xfrm>
+            <a:prstGeom prst="rect">
+              <a:avLst/>
+            </a:prstGeom>
+            <a:noFill/>
+          </p:spPr>
+          <p:txBody>
+            <a:bodyPr wrap="square" rtlCol="0">
+              <a:spAutoFit/>
+            </a:bodyPr>
+            <a:lstStyle/>
+            <a:p>
+              <a:r>
+                <a:rPr lang="de-DE" sz="1200" dirty="0"/>
+                <a:t>470,40 g</a:t>
+              </a:r>
+            </a:p>
+          </p:txBody>
+        </p:sp>
+        <p:sp>
+          <p:nvSpPr>
+            <p:cNvPr id="5" name="TextBox 4"/>
+            <p:cNvSpPr txBox="1"/>
+            <p:nvPr/>
+          </p:nvSpPr>
+          <p:spPr>
+            <a:xfrm>
+              <a:off x="8809127" y="4631151"/>
+              <a:ext cx="917576" cy="354592"/>
+            </a:xfrm>
+            <a:prstGeom prst="rect">
+              <a:avLst/>
+            </a:prstGeom>
+            <a:noFill/>
+          </p:spPr>
+          <p:txBody>
+            <a:bodyPr wrap="square" rtlCol="0">
+              <a:spAutoFit/>
+            </a:bodyPr>
+            <a:lstStyle/>
+            <a:p>
+              <a:r>
+                <a:rPr lang="de-DE" sz="1200" dirty="0"/>
+                <a:t>469,96 g</a:t>
+              </a:r>
+            </a:p>
+          </p:txBody>
+        </p:sp>
+      </p:grpSp>
+      <p:sp>
+        <p:nvSpPr>
+          <p:cNvPr id="6" name="TextBox 5"/>
+          <p:cNvSpPr txBox="1"/>
+          <p:nvPr/>
+        </p:nvSpPr>
+        <p:spPr>
+          <a:xfrm>
+            <a:off x="405261" y="4591714"/>
+            <a:ext cx="1683551" cy="584775"/>
+          </a:xfrm>
+          <a:prstGeom prst="rect">
+            <a:avLst/>
+          </a:prstGeom>
+          <a:noFill/>
+        </p:spPr>
+        <p:txBody>
+          <a:bodyPr wrap="square" rtlCol="0">
+            <a:spAutoFit/>
+          </a:bodyPr>
+          <a:lstStyle/>
+          <a:p>
+            <a:pPr algn="ctr"/>
+            <a:r>
+              <a:rPr lang="de-DE" sz="1600" dirty="0"/>
+              <a:t>Fertigen Ansatz wiegen (2x)</a:t>
+            </a:r>
+          </a:p>
+        </p:txBody>
+      </p:sp>
+      <p:cxnSp>
+        <p:nvCxnSpPr>
+          <p:cNvPr id="13" name="Straight Arrow Connector 12"/>
+          <p:cNvCxnSpPr/>
+          <p:nvPr/>
+        </p:nvCxnSpPr>
+        <p:spPr>
+          <a:xfrm>
+            <a:off x="1640541" y="3570639"/>
+            <a:ext cx="236668" cy="0"/>
+          </a:xfrm>
+          <a:prstGeom prst="straightConnector1">
+            <a:avLst/>
+          </a:prstGeom>
+          <a:ln w="31750">
+            <a:solidFill>
+              <a:schemeClr val="bg1">
+                <a:lumMod val="65000"/>
+              </a:schemeClr>
+            </a:solidFill>
+            <a:tailEnd type="triangle" w="lg" len="lg"/>
+          </a:ln>
+        </p:spPr>
+        <p:style>
+          <a:lnRef idx="1">
+            <a:schemeClr val="accent1"/>
+          </a:lnRef>
+          <a:fillRef idx="0">
+            <a:schemeClr val="accent1"/>
+          </a:fillRef>
+          <a:effectRef idx="0">
+            <a:schemeClr val="accent1"/>
+          </a:effectRef>
+          <a:fontRef idx="minor">
+            <a:schemeClr val="tx1"/>
+          </a:fontRef>
+        </p:style>
+      </p:cxnSp>
+      <p:grpSp>
+        <p:nvGrpSpPr>
+          <p:cNvPr id="12" name="Group 11">
+            <a:extLst>
+              <a:ext uri="{FF2B5EF4-FFF2-40B4-BE49-F238E27FC236}">
+                <a16:creationId xmlns:a16="http://schemas.microsoft.com/office/drawing/2014/main" id="{D0ED9CD6-B0E0-4B71-8559-6349E8AAEBC7}"/>
+              </a:ext>
+            </a:extLst>
+          </p:cNvPr>
+          <p:cNvGrpSpPr/>
+          <p:nvPr/>
+        </p:nvGrpSpPr>
+        <p:grpSpPr>
+          <a:xfrm>
+            <a:off x="335591" y="1598591"/>
+            <a:ext cx="1904445" cy="2962373"/>
+            <a:chOff x="404039" y="351788"/>
+            <a:chExt cx="2335808" cy="3856617"/>
+          </a:xfrm>
+        </p:grpSpPr>
+        <p:pic>
+          <p:nvPicPr>
+            <p:cNvPr id="21" name="Picture 20">
+              <a:extLst>
+                <a:ext uri="{FF2B5EF4-FFF2-40B4-BE49-F238E27FC236}">
+                  <a16:creationId xmlns:a16="http://schemas.microsoft.com/office/drawing/2014/main" id="{FD8B4F90-3E95-4903-B4A5-C3CCDA6D2F93}"/>
+                </a:ext>
+              </a:extLst>
+            </p:cNvPr>
+            <p:cNvPicPr>
+              <a:picLocks noChangeAspect="1"/>
+            </p:cNvPicPr>
+            <p:nvPr/>
+          </p:nvPicPr>
+          <p:blipFill rotWithShape="1">
+            <a:blip r:embed="rId4" cstate="print">
+              <a:extLst>
+                <a:ext uri="{BEBA8EAE-BF5A-486C-A8C5-ECC9F3942E4B}">
+                  <a14:imgProps xmlns:a14="http://schemas.microsoft.com/office/drawing/2010/main">
+                    <a14:imgLayer r:embed="rId5">
+                      <a14:imgEffect>
+                        <a14:sharpenSoften amount="50000"/>
+                      </a14:imgEffect>
+                    </a14:imgLayer>
+                  </a14:imgProps>
+                </a:ext>
+                <a:ext uri="{28A0092B-C50C-407E-A947-70E740481C1C}">
+                  <a14:useLocalDpi xmlns:a14="http://schemas.microsoft.com/office/drawing/2010/main" val="0"/>
+                </a:ext>
+              </a:extLst>
+            </a:blip>
+            <a:srcRect t="24470" r="80841" b="19294"/>
+            <a:stretch/>
+          </p:blipFill>
+          <p:spPr>
+            <a:xfrm>
+              <a:off x="404039" y="351788"/>
+              <a:ext cx="2335808" cy="3856617"/>
+            </a:xfrm>
+            <a:prstGeom prst="rect">
+              <a:avLst/>
+            </a:prstGeom>
+          </p:spPr>
+        </p:pic>
+        <p:sp>
+          <p:nvSpPr>
+            <p:cNvPr id="3" name="TextBox 2"/>
+            <p:cNvSpPr txBox="1"/>
+            <p:nvPr/>
+          </p:nvSpPr>
+          <p:spPr>
+            <a:xfrm>
+              <a:off x="1064370" y="3510543"/>
+              <a:ext cx="915209" cy="360616"/>
+            </a:xfrm>
+            <a:prstGeom prst="rect">
+              <a:avLst/>
+            </a:prstGeom>
+            <a:noFill/>
+          </p:spPr>
+          <p:txBody>
+            <a:bodyPr wrap="square" rtlCol="0">
+              <a:spAutoFit/>
+            </a:bodyPr>
+            <a:lstStyle/>
+            <a:p>
+              <a:r>
+                <a:rPr lang="de-DE" sz="1200" dirty="0"/>
+                <a:t>470,41 g</a:t>
+              </a:r>
+            </a:p>
+          </p:txBody>
+        </p:sp>
+      </p:grpSp>
+      <p:sp>
+        <p:nvSpPr>
+          <p:cNvPr id="32" name="TextBox 31">
+            <a:extLst>
+              <a:ext uri="{FF2B5EF4-FFF2-40B4-BE49-F238E27FC236}">
+                <a16:creationId xmlns:a16="http://schemas.microsoft.com/office/drawing/2014/main" id="{D29451E0-3339-4839-8F31-1A03898953AC}"/>
+              </a:ext>
+            </a:extLst>
+          </p:cNvPr>
+          <p:cNvSpPr txBox="1"/>
+          <p:nvPr/>
+        </p:nvSpPr>
+        <p:spPr>
+          <a:xfrm>
+            <a:off x="7899486" y="4591714"/>
+            <a:ext cx="2130498" cy="584775"/>
+          </a:xfrm>
+          <a:prstGeom prst="rect">
+            <a:avLst/>
+          </a:prstGeom>
+          <a:noFill/>
+        </p:spPr>
+        <p:txBody>
+          <a:bodyPr wrap="square" rtlCol="0">
+            <a:spAutoFit/>
+          </a:bodyPr>
+          <a:lstStyle/>
+          <a:p>
+            <a:pPr algn="ctr"/>
+            <a:r>
+              <a:rPr lang="de-DE" sz="1600" dirty="0"/>
+              <a:t>Biogas entnehmen &amp; Volumen bestimmen</a:t>
+            </a:r>
+          </a:p>
+        </p:txBody>
+      </p:sp>
+      <p:sp>
+        <p:nvSpPr>
+          <p:cNvPr id="33" name="TextBox 32">
+            <a:extLst>
+              <a:ext uri="{FF2B5EF4-FFF2-40B4-BE49-F238E27FC236}">
+                <a16:creationId xmlns:a16="http://schemas.microsoft.com/office/drawing/2014/main" id="{C0BE2FCD-9AA0-4DBA-B3A0-BE4CCEDBE4FD}"/>
+              </a:ext>
+            </a:extLst>
+          </p:cNvPr>
+          <p:cNvSpPr txBox="1"/>
+          <p:nvPr/>
+        </p:nvSpPr>
+        <p:spPr>
+          <a:xfrm>
+            <a:off x="9816662" y="4591714"/>
+            <a:ext cx="1683551" cy="338554"/>
+          </a:xfrm>
+          <a:prstGeom prst="rect">
+            <a:avLst/>
+          </a:prstGeom>
+          <a:noFill/>
+        </p:spPr>
+        <p:txBody>
+          <a:bodyPr wrap="square" rtlCol="0">
+            <a:spAutoFit/>
+          </a:bodyPr>
+          <a:lstStyle/>
+          <a:p>
+            <a:pPr algn="ctr"/>
+            <a:r>
+              <a:rPr lang="de-DE" sz="1600" dirty="0"/>
+              <a:t>Wiegen</a:t>
+            </a:r>
+          </a:p>
+        </p:txBody>
+      </p:sp>
+      <p:sp>
+        <p:nvSpPr>
+          <p:cNvPr id="34" name="TextBox 33">
+            <a:extLst>
+              <a:ext uri="{FF2B5EF4-FFF2-40B4-BE49-F238E27FC236}">
+                <a16:creationId xmlns:a16="http://schemas.microsoft.com/office/drawing/2014/main" id="{8080D2D1-F472-4764-AEEB-C6D039B42CD3}"/>
+              </a:ext>
+            </a:extLst>
+          </p:cNvPr>
+          <p:cNvSpPr txBox="1"/>
+          <p:nvPr/>
+        </p:nvSpPr>
+        <p:spPr>
+          <a:xfrm>
+            <a:off x="6263033" y="4591714"/>
+            <a:ext cx="1683551" cy="338554"/>
+          </a:xfrm>
+          <a:prstGeom prst="rect">
+            <a:avLst/>
+          </a:prstGeom>
+          <a:noFill/>
+        </p:spPr>
+        <p:txBody>
+          <a:bodyPr wrap="square" rtlCol="0">
+            <a:spAutoFit/>
+          </a:bodyPr>
+          <a:lstStyle/>
+          <a:p>
+            <a:pPr algn="ctr"/>
+            <a:r>
+              <a:rPr lang="de-DE" sz="1600" dirty="0"/>
+              <a:t>Wiegen</a:t>
+            </a:r>
+          </a:p>
+        </p:txBody>
+      </p:sp>
+      <p:grpSp>
+        <p:nvGrpSpPr>
+          <p:cNvPr id="30" name="Group 29">
+            <a:extLst>
+              <a:ext uri="{FF2B5EF4-FFF2-40B4-BE49-F238E27FC236}">
+                <a16:creationId xmlns:a16="http://schemas.microsoft.com/office/drawing/2014/main" id="{F0B661A7-94FD-4FDD-9657-4526BBE3C57A}"/>
+              </a:ext>
+            </a:extLst>
+          </p:cNvPr>
+          <p:cNvGrpSpPr/>
+          <p:nvPr/>
+        </p:nvGrpSpPr>
+        <p:grpSpPr>
+          <a:xfrm>
+            <a:off x="4961942" y="2467544"/>
+            <a:ext cx="769147" cy="1778233"/>
+            <a:chOff x="4858980" y="2469699"/>
+            <a:chExt cx="769147" cy="1778233"/>
+          </a:xfrm>
+        </p:grpSpPr>
+        <p:pic>
+          <p:nvPicPr>
+            <p:cNvPr id="39" name="Picture 38">
+              <a:extLst>
+                <a:ext uri="{FF2B5EF4-FFF2-40B4-BE49-F238E27FC236}">
+                  <a16:creationId xmlns:a16="http://schemas.microsoft.com/office/drawing/2014/main" id="{9DB10FFD-E715-4870-AD41-9EFC8AD39C40}"/>
+                </a:ext>
+              </a:extLst>
+            </p:cNvPr>
+            <p:cNvPicPr>
+              <a:picLocks noChangeAspect="1"/>
+            </p:cNvPicPr>
+            <p:nvPr/>
+          </p:nvPicPr>
+          <p:blipFill rotWithShape="1">
+            <a:blip r:embed="rId6" cstate="print">
+              <a:clrChange>
+                <a:clrFrom>
+                  <a:srgbClr val="FFFFFF"/>
+                </a:clrFrom>
+                <a:clrTo>
+                  <a:srgbClr val="FFFFFF">
+                    <a:alpha val="0"/>
+                  </a:srgbClr>
+                </a:clrTo>
+              </a:clrChange>
+              <a:extLst>
+                <a:ext uri="{28A0092B-C50C-407E-A947-70E740481C1C}">
+                  <a14:useLocalDpi xmlns:a14="http://schemas.microsoft.com/office/drawing/2010/main" val="0"/>
+                </a:ext>
+              </a:extLst>
+            </a:blip>
+            <a:srcRect l="19974" t="4157" r="27320" b="4471"/>
+            <a:stretch/>
+          </p:blipFill>
+          <p:spPr>
+            <a:xfrm rot="60000">
+              <a:off x="4858980" y="2469699"/>
+              <a:ext cx="769147" cy="1778233"/>
+            </a:xfrm>
+            <a:prstGeom prst="rect">
+              <a:avLst/>
+            </a:prstGeom>
+          </p:spPr>
+        </p:pic>
+        <p:sp>
+          <p:nvSpPr>
+            <p:cNvPr id="29" name="Arrow: Curved Up 28">
+              <a:extLst>
+                <a:ext uri="{FF2B5EF4-FFF2-40B4-BE49-F238E27FC236}">
+                  <a16:creationId xmlns:a16="http://schemas.microsoft.com/office/drawing/2014/main" id="{45EE86BD-BE1D-4AAF-A9C2-691259958E1F}"/>
+                </a:ext>
+              </a:extLst>
+            </p:cNvPr>
+            <p:cNvSpPr/>
+            <p:nvPr/>
+          </p:nvSpPr>
+          <p:spPr>
+            <a:xfrm rot="18387196">
+              <a:off x="5122121" y="3826227"/>
+              <a:ext cx="513883" cy="250429"/>
+            </a:xfrm>
+            <a:prstGeom prst="curvedUpArrow">
+              <a:avLst>
+                <a:gd name="adj1" fmla="val 12524"/>
+                <a:gd name="adj2" fmla="val 50000"/>
+                <a:gd name="adj3" fmla="val 35140"/>
+              </a:avLst>
+            </a:prstGeom>
+            <a:solidFill>
+              <a:schemeClr val="tx1">
+                <a:lumMod val="75000"/>
+                <a:lumOff val="25000"/>
+              </a:schemeClr>
+            </a:solidFill>
+            <a:ln>
+              <a:solidFill>
+                <a:schemeClr val="tx1">
+                  <a:lumMod val="75000"/>
+                  <a:lumOff val="25000"/>
+                </a:schemeClr>
+              </a:solidFill>
+            </a:ln>
+          </p:spPr>
+          <p:style>
+            <a:lnRef idx="2">
+              <a:schemeClr val="accent1">
+                <a:shade val="50000"/>
+              </a:schemeClr>
+            </a:lnRef>
+            <a:fillRef idx="1">
+              <a:schemeClr val="accent1"/>
+            </a:fillRef>
+            <a:effectRef idx="0">
+              <a:schemeClr val="accent1"/>
+            </a:effectRef>
+            <a:fontRef idx="minor">
+              <a:schemeClr val="lt1"/>
+            </a:fontRef>
+          </p:style>
+          <p:txBody>
+            <a:bodyPr rtlCol="0" anchor="ctr"/>
+            <a:lstStyle/>
+            <a:p>
+              <a:pPr algn="ctr"/>
+              <a:endParaRPr lang="de-DE" dirty="0">
+                <a:solidFill>
+                  <a:schemeClr val="tx1"/>
+                </a:solidFill>
+              </a:endParaRPr>
+            </a:p>
+          </p:txBody>
+        </p:sp>
+        <p:sp>
+          <p:nvSpPr>
+            <p:cNvPr id="43" name="Arrow: Curved Up 42">
+              <a:extLst>
+                <a:ext uri="{FF2B5EF4-FFF2-40B4-BE49-F238E27FC236}">
+                  <a16:creationId xmlns:a16="http://schemas.microsoft.com/office/drawing/2014/main" id="{C0CA650F-C85C-418B-AB10-D1C61379BCB5}"/>
+                </a:ext>
+              </a:extLst>
+            </p:cNvPr>
+            <p:cNvSpPr/>
+            <p:nvPr/>
+          </p:nvSpPr>
+          <p:spPr>
+            <a:xfrm rot="7713109">
+              <a:off x="4850822" y="3673979"/>
+              <a:ext cx="513883" cy="250429"/>
+            </a:xfrm>
+            <a:prstGeom prst="curvedUpArrow">
+              <a:avLst>
+                <a:gd name="adj1" fmla="val 12524"/>
+                <a:gd name="adj2" fmla="val 50000"/>
+                <a:gd name="adj3" fmla="val 35140"/>
+              </a:avLst>
+            </a:prstGeom>
+            <a:solidFill>
+              <a:schemeClr val="tx1">
+                <a:lumMod val="75000"/>
+                <a:lumOff val="25000"/>
+              </a:schemeClr>
+            </a:solidFill>
+            <a:ln>
+              <a:solidFill>
+                <a:schemeClr val="tx1">
+                  <a:lumMod val="75000"/>
+                  <a:lumOff val="25000"/>
+                </a:schemeClr>
+              </a:solidFill>
+            </a:ln>
+          </p:spPr>
+          <p:style>
+            <a:lnRef idx="2">
+              <a:schemeClr val="accent1">
+                <a:shade val="50000"/>
+              </a:schemeClr>
+            </a:lnRef>
+            <a:fillRef idx="1">
+              <a:schemeClr val="accent1"/>
+            </a:fillRef>
+            <a:effectRef idx="0">
+              <a:schemeClr val="accent1"/>
+            </a:effectRef>
+            <a:fontRef idx="minor">
+              <a:schemeClr val="lt1"/>
+            </a:fontRef>
+          </p:style>
+          <p:txBody>
+            <a:bodyPr rtlCol="0" anchor="ctr"/>
+            <a:lstStyle/>
+            <a:p>
+              <a:pPr algn="ctr"/>
+              <a:endParaRPr lang="de-DE" dirty="0">
+                <a:solidFill>
+                  <a:schemeClr val="tx1"/>
+                </a:solidFill>
+              </a:endParaRPr>
+            </a:p>
+          </p:txBody>
+        </p:sp>
+      </p:grpSp>
+      <p:sp>
+        <p:nvSpPr>
+          <p:cNvPr id="45" name="Rectangle 44">
+            <a:extLst>
+              <a:ext uri="{FF2B5EF4-FFF2-40B4-BE49-F238E27FC236}">
+                <a16:creationId xmlns:a16="http://schemas.microsoft.com/office/drawing/2014/main" id="{29B813E3-DDB5-48CB-8E24-A7084AF49706}"/>
+              </a:ext>
+            </a:extLst>
+          </p:cNvPr>
+          <p:cNvSpPr/>
+          <p:nvPr/>
+        </p:nvSpPr>
+        <p:spPr>
+          <a:xfrm>
+            <a:off x="4921004" y="1936721"/>
+            <a:ext cx="877484" cy="338554"/>
+          </a:xfrm>
+          <a:prstGeom prst="rect">
+            <a:avLst/>
+          </a:prstGeom>
+        </p:spPr>
+        <p:txBody>
+          <a:bodyPr wrap="none">
+            <a:spAutoFit/>
+          </a:bodyPr>
+          <a:lstStyle/>
+          <a:p>
+            <a:pPr algn="ctr"/>
+            <a:r>
+              <a:rPr lang="de-DE" sz="1600" dirty="0"/>
+              <a:t>Schritt 4</a:t>
+            </a:r>
+          </a:p>
+        </p:txBody>
+      </p:sp>
+      <p:sp>
+        <p:nvSpPr>
+          <p:cNvPr id="46" name="Rectangle 45">
+            <a:extLst>
+              <a:ext uri="{FF2B5EF4-FFF2-40B4-BE49-F238E27FC236}">
+                <a16:creationId xmlns:a16="http://schemas.microsoft.com/office/drawing/2014/main" id="{AC3C56AE-9C8A-47D4-AA4A-B4F5B5074532}"/>
+              </a:ext>
+            </a:extLst>
+          </p:cNvPr>
+          <p:cNvSpPr/>
+          <p:nvPr/>
+        </p:nvSpPr>
+        <p:spPr>
+          <a:xfrm>
+            <a:off x="6683477" y="1936721"/>
+            <a:ext cx="877484" cy="338554"/>
+          </a:xfrm>
+          <a:prstGeom prst="rect">
+            <a:avLst/>
+          </a:prstGeom>
+        </p:spPr>
+        <p:txBody>
+          <a:bodyPr wrap="none">
+            <a:spAutoFit/>
+          </a:bodyPr>
+          <a:lstStyle/>
+          <a:p>
+            <a:pPr algn="ctr"/>
+            <a:r>
+              <a:rPr lang="de-DE" sz="1600" dirty="0"/>
+              <a:t>Schritt 5</a:t>
+            </a:r>
+          </a:p>
+        </p:txBody>
+      </p:sp>
+      <p:sp>
+        <p:nvSpPr>
+          <p:cNvPr id="47" name="Rectangle 46">
+            <a:extLst>
+              <a:ext uri="{FF2B5EF4-FFF2-40B4-BE49-F238E27FC236}">
+                <a16:creationId xmlns:a16="http://schemas.microsoft.com/office/drawing/2014/main" id="{4C1B108F-DAE9-48CE-9B55-723301C16505}"/>
+              </a:ext>
+            </a:extLst>
+          </p:cNvPr>
+          <p:cNvSpPr/>
+          <p:nvPr/>
+        </p:nvSpPr>
+        <p:spPr>
+          <a:xfrm>
+            <a:off x="7968259" y="1936721"/>
+            <a:ext cx="877484" cy="338554"/>
+          </a:xfrm>
+          <a:prstGeom prst="rect">
+            <a:avLst/>
+          </a:prstGeom>
+        </p:spPr>
+        <p:txBody>
+          <a:bodyPr wrap="none">
+            <a:spAutoFit/>
+          </a:bodyPr>
+          <a:lstStyle/>
+          <a:p>
+            <a:pPr algn="ctr"/>
+            <a:r>
+              <a:rPr lang="de-DE" sz="1600" dirty="0"/>
+              <a:t>Schritt 6</a:t>
+            </a:r>
+          </a:p>
+        </p:txBody>
+      </p:sp>
+      <p:sp>
+        <p:nvSpPr>
+          <p:cNvPr id="48" name="Rectangle 47">
+            <a:extLst>
+              <a:ext uri="{FF2B5EF4-FFF2-40B4-BE49-F238E27FC236}">
+                <a16:creationId xmlns:a16="http://schemas.microsoft.com/office/drawing/2014/main" id="{7EE3474E-4E6D-4A1E-885D-9A4EC8702424}"/>
+              </a:ext>
+            </a:extLst>
+          </p:cNvPr>
+          <p:cNvSpPr/>
+          <p:nvPr/>
+        </p:nvSpPr>
+        <p:spPr>
+          <a:xfrm>
+            <a:off x="10251150" y="1936721"/>
+            <a:ext cx="877484" cy="338554"/>
+          </a:xfrm>
+          <a:prstGeom prst="rect">
+            <a:avLst/>
+          </a:prstGeom>
+        </p:spPr>
+        <p:txBody>
+          <a:bodyPr wrap="none">
+            <a:spAutoFit/>
+          </a:bodyPr>
+          <a:lstStyle/>
+          <a:p>
+            <a:pPr algn="ctr"/>
+            <a:r>
+              <a:rPr lang="de-DE" sz="1600" dirty="0"/>
+              <a:t>Schritt 7</a:t>
+            </a:r>
+          </a:p>
+        </p:txBody>
+      </p:sp>
+      <p:sp>
+        <p:nvSpPr>
+          <p:cNvPr id="49" name="TextBox 48">
+            <a:extLst>
+              <a:ext uri="{FF2B5EF4-FFF2-40B4-BE49-F238E27FC236}">
+                <a16:creationId xmlns:a16="http://schemas.microsoft.com/office/drawing/2014/main" id="{1F09CDEF-4045-4193-8233-902F62702548}"/>
+              </a:ext>
+            </a:extLst>
+          </p:cNvPr>
+          <p:cNvSpPr txBox="1"/>
+          <p:nvPr/>
+        </p:nvSpPr>
+        <p:spPr>
+          <a:xfrm>
+            <a:off x="4445288" y="4583986"/>
+            <a:ext cx="1828916" cy="584775"/>
+          </a:xfrm>
+          <a:prstGeom prst="rect">
+            <a:avLst/>
+          </a:prstGeom>
+          <a:noFill/>
+        </p:spPr>
+        <p:txBody>
+          <a:bodyPr wrap="square" rtlCol="0">
+            <a:spAutoFit/>
+          </a:bodyPr>
+          <a:lstStyle/>
+          <a:p>
+            <a:pPr algn="ctr"/>
+            <a:r>
+              <a:rPr lang="de-DE" sz="1600" dirty="0"/>
+              <a:t>Mischen durch leichtes Schwenken</a:t>
+            </a:r>
+          </a:p>
+        </p:txBody>
+      </p:sp>
+      <p:sp>
+        <p:nvSpPr>
+          <p:cNvPr id="50" name="TextBox 49">
+            <a:extLst>
+              <a:ext uri="{FF2B5EF4-FFF2-40B4-BE49-F238E27FC236}">
+                <a16:creationId xmlns:a16="http://schemas.microsoft.com/office/drawing/2014/main" id="{38954428-B48E-4F19-9FAA-31400370D8BA}"/>
+              </a:ext>
+            </a:extLst>
+          </p:cNvPr>
+          <p:cNvSpPr txBox="1"/>
+          <p:nvPr/>
+        </p:nvSpPr>
+        <p:spPr>
+          <a:xfrm>
+            <a:off x="2356662" y="4583986"/>
+            <a:ext cx="2066011" cy="584775"/>
+          </a:xfrm>
+          <a:prstGeom prst="rect">
+            <a:avLst/>
+          </a:prstGeom>
+          <a:noFill/>
+        </p:spPr>
+        <p:txBody>
+          <a:bodyPr wrap="square" rtlCol="0">
+            <a:spAutoFit/>
+          </a:bodyPr>
+          <a:lstStyle/>
+          <a:p>
+            <a:pPr algn="ctr"/>
+            <a:r>
+              <a:rPr lang="de-DE" sz="1600" dirty="0"/>
+              <a:t>Zwischen den Messungen inkubieren</a:t>
+            </a:r>
+          </a:p>
+        </p:txBody>
+      </p:sp>
+      <p:cxnSp>
+        <p:nvCxnSpPr>
+          <p:cNvPr id="61" name="Connector: Elbow 60">
+            <a:extLst>
+              <a:ext uri="{FF2B5EF4-FFF2-40B4-BE49-F238E27FC236}">
+                <a16:creationId xmlns:a16="http://schemas.microsoft.com/office/drawing/2014/main" id="{CBBD4BD5-D619-43E6-9F64-5BDC32B7CEDE}"/>
+              </a:ext>
+            </a:extLst>
+          </p:cNvPr>
+          <p:cNvCxnSpPr>
+            <a:cxnSpLocks/>
+            <a:stCxn id="60" idx="2"/>
+            <a:endCxn id="58" idx="2"/>
+          </p:cNvCxnSpPr>
+          <p:nvPr/>
+        </p:nvCxnSpPr>
+        <p:spPr>
+          <a:xfrm rot="5400000">
+            <a:off x="7016586" y="1690791"/>
+            <a:ext cx="16384" cy="7369356"/>
+          </a:xfrm>
+          <a:prstGeom prst="bentConnector3">
+            <a:avLst>
+              <a:gd name="adj1" fmla="val 3820703"/>
+            </a:avLst>
+          </a:prstGeom>
+          <a:ln w="50800">
+            <a:solidFill>
+              <a:schemeClr val="tx1">
+                <a:lumMod val="50000"/>
+                <a:lumOff val="50000"/>
+              </a:schemeClr>
+            </a:solidFill>
+            <a:tailEnd type="triangle"/>
+          </a:ln>
+        </p:spPr>
+        <p:style>
+          <a:lnRef idx="1">
+            <a:schemeClr val="accent1"/>
+          </a:lnRef>
+          <a:fillRef idx="0">
+            <a:schemeClr val="accent1"/>
+          </a:fillRef>
+          <a:effectRef idx="0">
+            <a:schemeClr val="accent1"/>
+          </a:effectRef>
+          <a:fontRef idx="minor">
+            <a:schemeClr val="tx1"/>
+          </a:fontRef>
+        </p:style>
+      </p:cxnSp>
+      <p:cxnSp>
+        <p:nvCxnSpPr>
+          <p:cNvPr id="1027" name="Straight Arrow Connector 1026">
+            <a:extLst>
+              <a:ext uri="{FF2B5EF4-FFF2-40B4-BE49-F238E27FC236}">
+                <a16:creationId xmlns:a16="http://schemas.microsoft.com/office/drawing/2014/main" id="{ECF045B2-B2F0-4803-A32A-EC12AAC3598B}"/>
+              </a:ext>
+            </a:extLst>
+          </p:cNvPr>
+          <p:cNvCxnSpPr/>
+          <p:nvPr/>
+        </p:nvCxnSpPr>
+        <p:spPr>
+          <a:xfrm>
+            <a:off x="1859414" y="3332237"/>
+            <a:ext cx="642516" cy="0"/>
+          </a:xfrm>
+          <a:prstGeom prst="straightConnector1">
+            <a:avLst/>
+          </a:prstGeom>
+          <a:ln w="57150">
+            <a:solidFill>
+              <a:schemeClr val="tx1">
+                <a:lumMod val="50000"/>
+                <a:lumOff val="50000"/>
+              </a:schemeClr>
+            </a:solidFill>
+            <a:tailEnd type="triangle"/>
+          </a:ln>
+        </p:spPr>
+        <p:style>
+          <a:lnRef idx="1">
+            <a:schemeClr val="accent1"/>
+          </a:lnRef>
+          <a:fillRef idx="0">
+            <a:schemeClr val="accent1"/>
+          </a:fillRef>
+          <a:effectRef idx="0">
+            <a:schemeClr val="accent1"/>
+          </a:effectRef>
+          <a:fontRef idx="minor">
+            <a:schemeClr val="tx1"/>
+          </a:fontRef>
+        </p:style>
+      </p:cxnSp>
+      <p:cxnSp>
+        <p:nvCxnSpPr>
+          <p:cNvPr id="68" name="Straight Arrow Connector 67">
+            <a:extLst>
+              <a:ext uri="{FF2B5EF4-FFF2-40B4-BE49-F238E27FC236}">
+                <a16:creationId xmlns:a16="http://schemas.microsoft.com/office/drawing/2014/main" id="{C5B64843-9640-45B2-97E1-6B43945FCFFD}"/>
+              </a:ext>
+            </a:extLst>
+          </p:cNvPr>
+          <p:cNvCxnSpPr/>
+          <p:nvPr/>
+        </p:nvCxnSpPr>
+        <p:spPr>
+          <a:xfrm>
+            <a:off x="4252940" y="3311674"/>
+            <a:ext cx="642516" cy="0"/>
+          </a:xfrm>
+          <a:prstGeom prst="straightConnector1">
+            <a:avLst/>
+          </a:prstGeom>
+          <a:ln w="57150">
+            <a:solidFill>
+              <a:schemeClr val="tx1">
+                <a:lumMod val="50000"/>
+                <a:lumOff val="50000"/>
+              </a:schemeClr>
+            </a:solidFill>
+            <a:tailEnd type="triangle"/>
+          </a:ln>
+        </p:spPr>
+        <p:style>
+          <a:lnRef idx="1">
+            <a:schemeClr val="accent1"/>
+          </a:lnRef>
+          <a:fillRef idx="0">
+            <a:schemeClr val="accent1"/>
+          </a:fillRef>
+          <a:effectRef idx="0">
+            <a:schemeClr val="accent1"/>
+          </a:effectRef>
+          <a:fontRef idx="minor">
+            <a:schemeClr val="tx1"/>
+          </a:fontRef>
+        </p:style>
+      </p:cxnSp>
+      <p:cxnSp>
+        <p:nvCxnSpPr>
+          <p:cNvPr id="69" name="Straight Arrow Connector 68">
+            <a:extLst>
+              <a:ext uri="{FF2B5EF4-FFF2-40B4-BE49-F238E27FC236}">
+                <a16:creationId xmlns:a16="http://schemas.microsoft.com/office/drawing/2014/main" id="{ADDF6832-1C18-4F88-9D9A-62ABCE90DA79}"/>
+              </a:ext>
+            </a:extLst>
+          </p:cNvPr>
+          <p:cNvCxnSpPr/>
+          <p:nvPr/>
+        </p:nvCxnSpPr>
+        <p:spPr>
+          <a:xfrm>
+            <a:off x="5903525" y="3311674"/>
+            <a:ext cx="642516" cy="0"/>
+          </a:xfrm>
+          <a:prstGeom prst="straightConnector1">
+            <a:avLst/>
+          </a:prstGeom>
+          <a:ln w="57150">
+            <a:solidFill>
+              <a:schemeClr val="tx1">
+                <a:lumMod val="50000"/>
+                <a:lumOff val="50000"/>
+              </a:schemeClr>
+            </a:solidFill>
+            <a:tailEnd type="triangle"/>
+          </a:ln>
+        </p:spPr>
+        <p:style>
+          <a:lnRef idx="1">
+            <a:schemeClr val="accent1"/>
+          </a:lnRef>
+          <a:fillRef idx="0">
+            <a:schemeClr val="accent1"/>
+          </a:fillRef>
+          <a:effectRef idx="0">
+            <a:schemeClr val="accent1"/>
+          </a:effectRef>
+          <a:fontRef idx="minor">
+            <a:schemeClr val="tx1"/>
+          </a:fontRef>
+        </p:style>
+      </p:cxnSp>
+      <p:cxnSp>
+        <p:nvCxnSpPr>
+          <p:cNvPr id="70" name="Straight Arrow Connector 69">
+            <a:extLst>
+              <a:ext uri="{FF2B5EF4-FFF2-40B4-BE49-F238E27FC236}">
+                <a16:creationId xmlns:a16="http://schemas.microsoft.com/office/drawing/2014/main" id="{25906877-B091-4213-A330-301C8CD57687}"/>
+              </a:ext>
+            </a:extLst>
+          </p:cNvPr>
+          <p:cNvCxnSpPr/>
+          <p:nvPr/>
+        </p:nvCxnSpPr>
+        <p:spPr>
+          <a:xfrm>
+            <a:off x="7732407" y="3295948"/>
+            <a:ext cx="642516" cy="0"/>
+          </a:xfrm>
+          <a:prstGeom prst="straightConnector1">
+            <a:avLst/>
+          </a:prstGeom>
+          <a:ln w="57150">
+            <a:solidFill>
+              <a:schemeClr val="tx1">
+                <a:lumMod val="50000"/>
+                <a:lumOff val="50000"/>
+              </a:schemeClr>
+            </a:solidFill>
+            <a:tailEnd type="triangle"/>
+          </a:ln>
+        </p:spPr>
+        <p:style>
+          <a:lnRef idx="1">
+            <a:schemeClr val="accent1"/>
+          </a:lnRef>
+          <a:fillRef idx="0">
+            <a:schemeClr val="accent1"/>
+          </a:fillRef>
+          <a:effectRef idx="0">
+            <a:schemeClr val="accent1"/>
+          </a:effectRef>
+          <a:fontRef idx="minor">
+            <a:schemeClr val="tx1"/>
+          </a:fontRef>
+        </p:style>
+      </p:cxnSp>
+      <p:cxnSp>
+        <p:nvCxnSpPr>
+          <p:cNvPr id="71" name="Straight Arrow Connector 70">
+            <a:extLst>
+              <a:ext uri="{FF2B5EF4-FFF2-40B4-BE49-F238E27FC236}">
+                <a16:creationId xmlns:a16="http://schemas.microsoft.com/office/drawing/2014/main" id="{A9B316D3-6F34-4417-9972-AEBE92D5EA31}"/>
+              </a:ext>
+            </a:extLst>
+          </p:cNvPr>
+          <p:cNvCxnSpPr/>
+          <p:nvPr/>
+        </p:nvCxnSpPr>
+        <p:spPr>
+          <a:xfrm>
+            <a:off x="9495404" y="3285027"/>
+            <a:ext cx="642516" cy="0"/>
+          </a:xfrm>
+          <a:prstGeom prst="straightConnector1">
+            <a:avLst/>
+          </a:prstGeom>
+          <a:ln w="57150">
+            <a:solidFill>
+              <a:schemeClr val="tx1">
+                <a:lumMod val="50000"/>
+                <a:lumOff val="50000"/>
+              </a:schemeClr>
+            </a:solidFill>
+            <a:tailEnd type="triangle"/>
+          </a:ln>
+        </p:spPr>
+        <p:style>
+          <a:lnRef idx="1">
+            <a:schemeClr val="accent1"/>
+          </a:lnRef>
+          <a:fillRef idx="0">
+            <a:schemeClr val="accent1"/>
+          </a:fillRef>
+          <a:effectRef idx="0">
+            <a:schemeClr val="accent1"/>
+          </a:effectRef>
+          <a:fontRef idx="minor">
+            <a:schemeClr val="tx1"/>
+          </a:fontRef>
+        </p:style>
+      </p:cxnSp>
+      <p:sp>
+        <p:nvSpPr>
+          <p:cNvPr id="75" name="Rectangle 74">
+            <a:extLst>
+              <a:ext uri="{FF2B5EF4-FFF2-40B4-BE49-F238E27FC236}">
+                <a16:creationId xmlns:a16="http://schemas.microsoft.com/office/drawing/2014/main" id="{6F3C3E64-F6FB-45F9-967F-7A77D25B2E7F}"/>
+              </a:ext>
+            </a:extLst>
+          </p:cNvPr>
+          <p:cNvSpPr/>
+          <p:nvPr/>
+        </p:nvSpPr>
+        <p:spPr>
+          <a:xfrm>
+            <a:off x="5316501" y="5628114"/>
+            <a:ext cx="3090526" cy="338554"/>
+          </a:xfrm>
+          <a:prstGeom prst="rect">
+            <a:avLst/>
+          </a:prstGeom>
+        </p:spPr>
+        <p:txBody>
+          <a:bodyPr wrap="none">
+            <a:spAutoFit/>
+          </a:bodyPr>
+          <a:lstStyle/>
+          <a:p>
+            <a:pPr algn="ctr"/>
+            <a:r>
+              <a:rPr lang="de-DE" sz="1600" dirty="0"/>
+              <a:t>Wiederholen bis Test beendet wird</a:t>
+            </a:r>
+          </a:p>
+        </p:txBody>
+      </p:sp>
+      <p:grpSp>
+        <p:nvGrpSpPr>
+          <p:cNvPr id="1033" name="Group 1032">
+            <a:extLst>
+              <a:ext uri="{FF2B5EF4-FFF2-40B4-BE49-F238E27FC236}">
+                <a16:creationId xmlns:a16="http://schemas.microsoft.com/office/drawing/2014/main" id="{55A96AB8-242E-4947-84A3-3332ED10063B}"/>
+              </a:ext>
+            </a:extLst>
+          </p:cNvPr>
+          <p:cNvGrpSpPr/>
+          <p:nvPr/>
+        </p:nvGrpSpPr>
+        <p:grpSpPr>
+          <a:xfrm>
+            <a:off x="2097751" y="2068463"/>
+            <a:ext cx="2578348" cy="2578348"/>
+            <a:chOff x="2097751" y="2068463"/>
+            <a:chExt cx="2578348" cy="2578348"/>
+          </a:xfrm>
+        </p:grpSpPr>
+        <p:pic>
+          <p:nvPicPr>
+            <p:cNvPr id="1026" name="Picture 2" descr="Related image">
+              <a:extLst>
+                <a:ext uri="{FF2B5EF4-FFF2-40B4-BE49-F238E27FC236}">
+                  <a16:creationId xmlns:a16="http://schemas.microsoft.com/office/drawing/2014/main" id="{81059D91-1D57-4684-B72A-65B135B63DDE}"/>
+                </a:ext>
+              </a:extLst>
+            </p:cNvPr>
+            <p:cNvPicPr>
+              <a:picLocks noChangeAspect="1" noChangeArrowheads="1"/>
+            </p:cNvPicPr>
+            <p:nvPr/>
+          </p:nvPicPr>
+          <p:blipFill>
+            <a:blip r:embed="rId7">
+              <a:extLst>
+                <a:ext uri="{BEBA8EAE-BF5A-486C-A8C5-ECC9F3942E4B}">
+                  <a14:imgProps xmlns:a14="http://schemas.microsoft.com/office/drawing/2010/main">
+                    <a14:imgLayer r:embed="rId8">
+                      <a14:imgEffect>
+                        <a14:artisticPencilSketch/>
+                      </a14:imgEffect>
+                    </a14:imgLayer>
+                  </a14:imgProps>
+                </a:ext>
+                <a:ext uri="{28A0092B-C50C-407E-A947-70E740481C1C}">
+                  <a14:useLocalDpi xmlns:a14="http://schemas.microsoft.com/office/drawing/2010/main" val="0"/>
+                </a:ext>
+              </a:extLst>
+            </a:blip>
+            <a:srcRect/>
+            <a:stretch>
+              <a:fillRect/>
+            </a:stretch>
+          </p:blipFill>
+          <p:spPr bwMode="auto">
+            <a:xfrm>
+              <a:off x="2097751" y="2068463"/>
+              <a:ext cx="2578348" cy="2578348"/>
+            </a:xfrm>
+            <a:prstGeom prst="rect">
+              <a:avLst/>
+            </a:prstGeom>
+            <a:noFill/>
+            <a:extLst>
+              <a:ext uri="{909E8E84-426E-40DD-AFC4-6F175D3DCCD1}">
+                <a14:hiddenFill xmlns:a14="http://schemas.microsoft.com/office/drawing/2010/main">
+                  <a:solidFill>
+                    <a:srgbClr val="FFFFFF"/>
+                  </a:solidFill>
+                </a14:hiddenFill>
+              </a:ext>
+            </a:extLst>
+          </p:spPr>
+        </p:pic>
+        <p:pic>
+          <p:nvPicPr>
+            <p:cNvPr id="1031" name="Picture 1030">
+              <a:extLst>
+                <a:ext uri="{FF2B5EF4-FFF2-40B4-BE49-F238E27FC236}">
+                  <a16:creationId xmlns:a16="http://schemas.microsoft.com/office/drawing/2014/main" id="{EA7ADB34-1D04-4E94-8313-2151A5E4A1CB}"/>
+                </a:ext>
+              </a:extLst>
+            </p:cNvPr>
+            <p:cNvPicPr>
+              <a:picLocks noChangeAspect="1"/>
+            </p:cNvPicPr>
+            <p:nvPr/>
+          </p:nvPicPr>
+          <p:blipFill>
+            <a:blip r:embed="rId9"/>
+            <a:stretch>
+              <a:fillRect/>
+            </a:stretch>
+          </p:blipFill>
+          <p:spPr>
+            <a:xfrm>
+              <a:off x="3715047" y="3867149"/>
+              <a:ext cx="345906" cy="290209"/>
+            </a:xfrm>
+            <a:prstGeom prst="rect">
+              <a:avLst/>
+            </a:prstGeom>
+          </p:spPr>
+        </p:pic>
+        <p:sp>
+          <p:nvSpPr>
+            <p:cNvPr id="1032" name="Rectangle 1031">
+              <a:extLst>
+                <a:ext uri="{FF2B5EF4-FFF2-40B4-BE49-F238E27FC236}">
+                  <a16:creationId xmlns:a16="http://schemas.microsoft.com/office/drawing/2014/main" id="{72270D91-41C7-415C-A4F9-1914EA999B11}"/>
+                </a:ext>
+              </a:extLst>
+            </p:cNvPr>
+            <p:cNvSpPr/>
+            <p:nvPr/>
+          </p:nvSpPr>
+          <p:spPr>
+            <a:xfrm>
+              <a:off x="3085331" y="3914503"/>
+              <a:ext cx="367931" cy="290209"/>
+            </a:xfrm>
+            <a:prstGeom prst="rect">
+              <a:avLst/>
+            </a:prstGeom>
+            <a:solidFill>
+              <a:schemeClr val="bg1"/>
+            </a:solidFill>
+            <a:ln>
+              <a:solidFill>
+                <a:schemeClr val="bg1"/>
+              </a:solidFill>
+            </a:ln>
+          </p:spPr>
+          <p:style>
+            <a:lnRef idx="2">
+              <a:schemeClr val="accent1">
+                <a:shade val="50000"/>
+              </a:schemeClr>
+            </a:lnRef>
+            <a:fillRef idx="1">
+              <a:schemeClr val="accent1"/>
+            </a:fillRef>
+            <a:effectRef idx="0">
+              <a:schemeClr val="accent1"/>
+            </a:effectRef>
+            <a:fontRef idx="minor">
+              <a:schemeClr val="lt1"/>
+            </a:fontRef>
+          </p:style>
+          <p:txBody>
+            <a:bodyPr rtlCol="0" anchor="ctr"/>
+            <a:lstStyle/>
+            <a:p>
+              <a:pPr algn="ctr"/>
+              <a:endParaRPr lang="de-DE" dirty="0"/>
+            </a:p>
+          </p:txBody>
+        </p:sp>
+        <p:sp>
+          <p:nvSpPr>
+            <p:cNvPr id="78" name="Rectangle 77">
+              <a:extLst>
+                <a:ext uri="{FF2B5EF4-FFF2-40B4-BE49-F238E27FC236}">
+                  <a16:creationId xmlns:a16="http://schemas.microsoft.com/office/drawing/2014/main" id="{51FC4984-08FF-44FD-A77A-EB3099BF4428}"/>
+                </a:ext>
+              </a:extLst>
+            </p:cNvPr>
+            <p:cNvSpPr/>
+            <p:nvPr/>
+          </p:nvSpPr>
+          <p:spPr>
+            <a:xfrm>
+              <a:off x="3538539" y="2643679"/>
+              <a:ext cx="428098" cy="797373"/>
+            </a:xfrm>
+            <a:prstGeom prst="rect">
+              <a:avLst/>
+            </a:prstGeom>
+            <a:solidFill>
+              <a:schemeClr val="bg1"/>
+            </a:solidFill>
+            <a:ln>
+              <a:solidFill>
+                <a:schemeClr val="bg1"/>
+              </a:solidFill>
+            </a:ln>
+          </p:spPr>
+          <p:style>
+            <a:lnRef idx="2">
+              <a:schemeClr val="accent1">
+                <a:shade val="50000"/>
+              </a:schemeClr>
+            </a:lnRef>
+            <a:fillRef idx="1">
+              <a:schemeClr val="accent1"/>
+            </a:fillRef>
+            <a:effectRef idx="0">
+              <a:schemeClr val="accent1"/>
+            </a:effectRef>
+            <a:fontRef idx="minor">
+              <a:schemeClr val="lt1"/>
+            </a:fontRef>
+          </p:style>
+          <p:txBody>
+            <a:bodyPr rtlCol="0" anchor="ctr"/>
+            <a:lstStyle/>
+            <a:p>
+              <a:pPr algn="ctr"/>
+              <a:endParaRPr lang="de-DE" dirty="0"/>
+            </a:p>
+          </p:txBody>
+        </p:sp>
+      </p:grpSp>
+    </p:spTree>
+    <p:extLst>
+      <p:ext uri="{BB962C8B-B14F-4D97-AF65-F5344CB8AC3E}">
+        <p14:creationId xmlns:p14="http://schemas.microsoft.com/office/powerpoint/2010/main" val="4005081328"/>
+      </p:ext>
+    </p:extLst>
+  </p:cSld>
+  <p:clrMapOvr>
+    <a:masterClrMapping/>
+  </p:clrMapOvr>
+</p:sld>
+</file>
+
 <file path=ppt/theme/theme1.xml><?xml version="1.0" encoding="utf-8"?>
 <a:theme xmlns:a="http://schemas.openxmlformats.org/drawingml/2006/main" name="Office Theme">
   <a:themeElements>
@@ -6727,12 +8131,9 @@
 </file>
 
 <file path=customXml/item1.xml><?xml version="1.0" encoding="utf-8"?>
-<?mso-contentType ?>
-<FormTemplates xmlns="http://schemas.microsoft.com/sharepoint/v3/contenttype/forms">
-  <Display>DocumentLibraryForm</Display>
-  <Edit>DocumentLibraryForm</Edit>
-  <New>DocumentLibraryForm</New>
-</FormTemplates>
+<p:properties xmlns:p="http://schemas.microsoft.com/office/2006/metadata/properties" xmlns:xsi="http://www.w3.org/2001/XMLSchema-instance" xmlns:pc="http://schemas.microsoft.com/office/infopath/2007/PartnerControls">
+  <documentManagement/>
+</p:properties>
 </file>
 
 <file path=customXml/item2.xml><?xml version="1.0" encoding="utf-8"?>
@@ -6959,15 +8360,19 @@
 </file>
 
 <file path=customXml/item3.xml><?xml version="1.0" encoding="utf-8"?>
-<p:properties xmlns:p="http://schemas.microsoft.com/office/2006/metadata/properties" xmlns:xsi="http://www.w3.org/2001/XMLSchema-instance" xmlns:pc="http://schemas.microsoft.com/office/infopath/2007/PartnerControls">
-  <documentManagement/>
-</p:properties>
+<?mso-contentType ?>
+<FormTemplates xmlns="http://schemas.microsoft.com/sharepoint/v3/contenttype/forms">
+  <Display>DocumentLibraryForm</Display>
+  <Edit>DocumentLibraryForm</Edit>
+  <New>DocumentLibraryForm</New>
+</FormTemplates>
 </file>
 
 <file path=customXml/itemProps1.xml><?xml version="1.0" encoding="utf-8"?>
-<ds:datastoreItem xmlns:ds="http://schemas.openxmlformats.org/officeDocument/2006/customXml" ds:itemID="{F9F8DFC0-E5B2-411E-A039-662EE7602A33}">
+<ds:datastoreItem xmlns:ds="http://schemas.openxmlformats.org/officeDocument/2006/customXml" ds:itemID="{987DCCE1-C40A-469C-B9B3-5A4C3D0496F4}">
   <ds:schemaRefs>
-    <ds:schemaRef ds:uri="http://schemas.microsoft.com/sharepoint/v3/contenttype/forms"/>
+    <ds:schemaRef ds:uri="http://schemas.microsoft.com/office/2006/metadata/properties"/>
+    <ds:schemaRef ds:uri="http://schemas.microsoft.com/office/infopath/2007/PartnerControls"/>
   </ds:schemaRefs>
 </ds:datastoreItem>
 </file>
@@ -6992,10 +8397,9 @@
 </file>
 
 <file path=customXml/itemProps3.xml><?xml version="1.0" encoding="utf-8"?>
-<ds:datastoreItem xmlns:ds="http://schemas.openxmlformats.org/officeDocument/2006/customXml" ds:itemID="{987DCCE1-C40A-469C-B9B3-5A4C3D0496F4}">
+<ds:datastoreItem xmlns:ds="http://schemas.openxmlformats.org/officeDocument/2006/customXml" ds:itemID="{F9F8DFC0-E5B2-411E-A039-662EE7602A33}">
   <ds:schemaRefs>
-    <ds:schemaRef ds:uri="http://schemas.microsoft.com/office/2006/metadata/properties"/>
-    <ds:schemaRef ds:uri="http://schemas.microsoft.com/office/infopath/2007/PartnerControls"/>
+    <ds:schemaRef ds:uri="http://schemas.microsoft.com/sharepoint/v3/contenttype/forms"/>
   </ds:schemaRefs>
 </ds:datastoreItem>
 </file>
</xml_diff>